<commit_message>
Changes in Gantt Chart and new sentences written
</commit_message>
<xml_diff>
--- a/Article Writing and Latex Files/Example Instance/Exemplo_Gantt (1).pptx
+++ b/Article Writing and Latex Files/Example Instance/Exemplo_Gantt (1).pptx
@@ -1857,7 +1857,7 @@
                 </a:solidFill>
                 <a:latin typeface="Calibri"/>
               </a:rPr>
-              <a:t>4/15/2020</a:t>
+              <a:t>4/17/2020</a:t>
             </a:fld>
             <a:endParaRPr lang="en-US" sz="1200" b="0" strike="noStrike" spc="-1">
               <a:latin typeface="Times New Roman"/>
@@ -15114,7 +15114,7 @@
           <p:nvPr>
             <p:extLst>
               <p:ext uri="{D42A27DB-BD31-4B8C-83A1-F6EECF244321}">
-                <p14:modId xmlns:p14="http://schemas.microsoft.com/office/powerpoint/2010/main" val="3525012312"/>
+                <p14:modId xmlns:p14="http://schemas.microsoft.com/office/powerpoint/2010/main" val="4143620592"/>
               </p:ext>
             </p:extLst>
           </p:nvPr>
@@ -15148,7 +15148,7 @@
                           </a:solidFill>
                           <a:latin typeface="Times New Roman"/>
                         </a:rPr>
-                        <a:t>6</a:t>
+                        <a:t>4</a:t>
                       </a:r>
                       <a:endParaRPr lang="en-US" sz="1100" b="0" strike="noStrike" spc="-1" dirty="0">
                         <a:latin typeface="+mn-lt"/>

</xml_diff>